<commit_message>
data wrangling; created static and interactive maps
</commit_message>
<xml_diff>
--- a/UI_outline.pptx
+++ b/UI_outline.pptx
@@ -110,6 +110,11 @@
       </a:defRPr>
     </a:lvl9pPr>
   </p:defaultTextStyle>
+  <p:extLst>
+    <p:ext uri="{EFAFB233-063F-42B5-8137-9DF3F51BA10A}">
+      <p15:sldGuideLst xmlns:p15="http://schemas.microsoft.com/office/powerpoint/2012/main"/>
+    </p:ext>
+  </p:extLst>
 </p:presentation>
 </file>
 
@@ -195,7 +200,7 @@
           <a:p>
             <a:fld id="{C26C2AB4-2641-4C2B-930E-B597BAD1C04D}" type="datetimeFigureOut">
               <a:rPr lang="en-US" smtClean="0"/>
-              <a:t>29-Jan-19</a:t>
+              <a:t>05-Feb-19</a:t>
             </a:fld>
             <a:endParaRPr lang="en-US"/>
           </a:p>
@@ -409,7 +414,7 @@
           <a:p>
             <a:fld id="{8C00B558-DE13-448B-B31C-8C5066E3D3C0}" type="datetimeFigureOut">
               <a:rPr lang="en-US" smtClean="0"/>
-              <a:t>29-Jan-19</a:t>
+              <a:t>05-Feb-19</a:t>
             </a:fld>
             <a:endParaRPr lang="en-US"/>
           </a:p>
@@ -579,7 +584,7 @@
           <a:p>
             <a:fld id="{8C00B558-DE13-448B-B31C-8C5066E3D3C0}" type="datetimeFigureOut">
               <a:rPr lang="en-US" smtClean="0"/>
-              <a:t>29-Jan-19</a:t>
+              <a:t>05-Feb-19</a:t>
             </a:fld>
             <a:endParaRPr lang="en-US"/>
           </a:p>
@@ -759,7 +764,7 @@
           <a:p>
             <a:fld id="{8C00B558-DE13-448B-B31C-8C5066E3D3C0}" type="datetimeFigureOut">
               <a:rPr lang="en-US" smtClean="0"/>
-              <a:t>29-Jan-19</a:t>
+              <a:t>05-Feb-19</a:t>
             </a:fld>
             <a:endParaRPr lang="en-US"/>
           </a:p>
@@ -929,7 +934,7 @@
           <a:p>
             <a:fld id="{8C00B558-DE13-448B-B31C-8C5066E3D3C0}" type="datetimeFigureOut">
               <a:rPr lang="en-US" smtClean="0"/>
-              <a:t>29-Jan-19</a:t>
+              <a:t>05-Feb-19</a:t>
             </a:fld>
             <a:endParaRPr lang="en-US"/>
           </a:p>
@@ -1173,7 +1178,7 @@
           <a:p>
             <a:fld id="{8C00B558-DE13-448B-B31C-8C5066E3D3C0}" type="datetimeFigureOut">
               <a:rPr lang="en-US" smtClean="0"/>
-              <a:t>29-Jan-19</a:t>
+              <a:t>05-Feb-19</a:t>
             </a:fld>
             <a:endParaRPr lang="en-US"/>
           </a:p>
@@ -1405,7 +1410,7 @@
           <a:p>
             <a:fld id="{8C00B558-DE13-448B-B31C-8C5066E3D3C0}" type="datetimeFigureOut">
               <a:rPr lang="en-US" smtClean="0"/>
-              <a:t>29-Jan-19</a:t>
+              <a:t>05-Feb-19</a:t>
             </a:fld>
             <a:endParaRPr lang="en-US"/>
           </a:p>
@@ -1772,7 +1777,7 @@
           <a:p>
             <a:fld id="{8C00B558-DE13-448B-B31C-8C5066E3D3C0}" type="datetimeFigureOut">
               <a:rPr lang="en-US" smtClean="0"/>
-              <a:t>29-Jan-19</a:t>
+              <a:t>05-Feb-19</a:t>
             </a:fld>
             <a:endParaRPr lang="en-US"/>
           </a:p>
@@ -1890,7 +1895,7 @@
           <a:p>
             <a:fld id="{8C00B558-DE13-448B-B31C-8C5066E3D3C0}" type="datetimeFigureOut">
               <a:rPr lang="en-US" smtClean="0"/>
-              <a:t>29-Jan-19</a:t>
+              <a:t>05-Feb-19</a:t>
             </a:fld>
             <a:endParaRPr lang="en-US"/>
           </a:p>
@@ -1985,7 +1990,7 @@
           <a:p>
             <a:fld id="{8C00B558-DE13-448B-B31C-8C5066E3D3C0}" type="datetimeFigureOut">
               <a:rPr lang="en-US" smtClean="0"/>
-              <a:t>29-Jan-19</a:t>
+              <a:t>05-Feb-19</a:t>
             </a:fld>
             <a:endParaRPr lang="en-US"/>
           </a:p>
@@ -2262,7 +2267,7 @@
           <a:p>
             <a:fld id="{8C00B558-DE13-448B-B31C-8C5066E3D3C0}" type="datetimeFigureOut">
               <a:rPr lang="en-US" smtClean="0"/>
-              <a:t>29-Jan-19</a:t>
+              <a:t>05-Feb-19</a:t>
             </a:fld>
             <a:endParaRPr lang="en-US"/>
           </a:p>
@@ -2519,7 +2524,7 @@
           <a:p>
             <a:fld id="{8C00B558-DE13-448B-B31C-8C5066E3D3C0}" type="datetimeFigureOut">
               <a:rPr lang="en-US" smtClean="0"/>
-              <a:t>29-Jan-19</a:t>
+              <a:t>05-Feb-19</a:t>
             </a:fld>
             <a:endParaRPr lang="en-US"/>
           </a:p>
@@ -2732,7 +2737,7 @@
           <a:p>
             <a:fld id="{8C00B558-DE13-448B-B31C-8C5066E3D3C0}" type="datetimeFigureOut">
               <a:rPr lang="en-US" smtClean="0"/>
-              <a:t>29-Jan-19</a:t>
+              <a:t>05-Feb-19</a:t>
             </a:fld>
             <a:endParaRPr lang="en-US"/>
           </a:p>
@@ -3696,7 +3701,7 @@
           <p:nvPr>
             <p:extLst>
               <p:ext uri="{D42A27DB-BD31-4B8C-83A1-F6EECF244321}">
-                <p14:modId xmlns:p14="http://schemas.microsoft.com/office/powerpoint/2010/main" val="687440141"/>
+                <p14:modId xmlns:p14="http://schemas.microsoft.com/office/powerpoint/2010/main" val="3615018444"/>
               </p:ext>
             </p:extLst>
           </p:nvPr>
@@ -3952,8 +3957,8 @@
                         <a:t>Tree </a:t>
                       </a:r>
                       <a:r>
-                        <a:rPr lang="en-US" sz="1100" dirty="0" err="1" smtClean="0"/>
-                        <a:t>mortaility</a:t>
+                        <a:rPr lang="en-US" sz="1100" dirty="0" smtClean="0"/>
+                        <a:t>mortality</a:t>
                       </a:r>
                       <a:endParaRPr lang="en-US" sz="1100" dirty="0"/>
                     </a:p>
@@ -4538,7 +4543,6 @@
               <a:rPr lang="en-US" sz="1400" b="1" dirty="0" smtClean="0"/>
               <a:t>Sidebar with a widget</a:t>
             </a:r>
-            <a:endParaRPr lang="en-US" sz="1400" b="1" dirty="0" smtClean="0"/>
           </a:p>
         </p:txBody>
       </p:sp>
@@ -4688,7 +4692,6 @@
               <a:rPr lang="en-US" sz="1400" b="1" dirty="0" smtClean="0"/>
               <a:t>Output: map</a:t>
             </a:r>
-            <a:endParaRPr lang="en-US" sz="1400" b="1" dirty="0" smtClean="0"/>
           </a:p>
         </p:txBody>
       </p:sp>
@@ -4717,7 +4720,6 @@
               <a:rPr lang="en-US" sz="1400" b="1" dirty="0" smtClean="0"/>
               <a:t>Output: table</a:t>
             </a:r>
-            <a:endParaRPr lang="en-US" sz="1400" b="1" dirty="0" smtClean="0"/>
           </a:p>
         </p:txBody>
       </p:sp>
@@ -4746,7 +4748,6 @@
               <a:rPr lang="en-US" sz="1400" b="1" dirty="0" smtClean="0"/>
               <a:t>Output: photo</a:t>
             </a:r>
-            <a:endParaRPr lang="en-US" sz="1400" b="1" dirty="0" smtClean="0"/>
           </a:p>
         </p:txBody>
       </p:sp>
@@ -5361,7 +5362,6 @@
               <a:rPr lang="en-US" sz="1400" b="1" dirty="0" smtClean="0"/>
               <a:t>Sidebar with a widget</a:t>
             </a:r>
-            <a:endParaRPr lang="en-US" sz="1400" b="1" dirty="0" smtClean="0"/>
           </a:p>
         </p:txBody>
       </p:sp>
@@ -5465,7 +5465,6 @@
               <a:rPr lang="en-US" sz="1400" b="1" dirty="0" smtClean="0"/>
               <a:t>Output: map</a:t>
             </a:r>
-            <a:endParaRPr lang="en-US" sz="1400" b="1" dirty="0" smtClean="0"/>
           </a:p>
         </p:txBody>
       </p:sp>
@@ -5494,7 +5493,6 @@
               <a:rPr lang="en-US" sz="1400" b="1" dirty="0" smtClean="0"/>
               <a:t>Output: pie chart</a:t>
             </a:r>
-            <a:endParaRPr lang="en-US" sz="1400" b="1" dirty="0" smtClean="0"/>
           </a:p>
         </p:txBody>
       </p:sp>
@@ -5523,7 +5521,6 @@
               <a:rPr lang="en-US" sz="1400" b="1" dirty="0" smtClean="0"/>
               <a:t>Output: photo</a:t>
             </a:r>
-            <a:endParaRPr lang="en-US" sz="1400" b="1" dirty="0" smtClean="0"/>
           </a:p>
         </p:txBody>
       </p:sp>
@@ -5634,7 +5631,6 @@
               <a:rPr lang="en-US" sz="1400" b="1" dirty="0" smtClean="0"/>
               <a:t>Output: table</a:t>
             </a:r>
-            <a:endParaRPr lang="en-US" sz="1400" b="1" dirty="0" smtClean="0"/>
           </a:p>
         </p:txBody>
       </p:sp>
@@ -6189,7 +6185,6 @@
               <a:rPr lang="en-US" sz="1400" b="1" dirty="0" smtClean="0"/>
               <a:t>Output: bar graph</a:t>
             </a:r>
-            <a:endParaRPr lang="en-US" sz="1400" b="1" dirty="0" smtClean="0"/>
           </a:p>
         </p:txBody>
       </p:sp>
@@ -6739,7 +6734,6 @@
               <a:rPr lang="en-US" sz="1100" dirty="0" smtClean="0"/>
               <a:t>High Severity</a:t>
             </a:r>
-            <a:endParaRPr lang="en-US" sz="1100" dirty="0" smtClean="0"/>
           </a:p>
           <a:p>
             <a:pPr marL="171450" indent="-171450">
@@ -6805,7 +6799,6 @@
               <a:rPr lang="en-US" sz="1400" b="1" dirty="0" smtClean="0"/>
               <a:t>Sidebar with widgets</a:t>
             </a:r>
-            <a:endParaRPr lang="en-US" sz="1400" b="1" dirty="0" smtClean="0"/>
           </a:p>
         </p:txBody>
       </p:sp>
@@ -7463,7 +7456,6 @@
               <a:rPr lang="en-US" sz="1400" b="1" dirty="0" smtClean="0"/>
               <a:t>Output: bar graph</a:t>
             </a:r>
-            <a:endParaRPr lang="en-US" sz="1400" b="1" dirty="0" smtClean="0"/>
           </a:p>
         </p:txBody>
       </p:sp>
@@ -7598,7 +7590,6 @@
               <a:rPr lang="en-US" sz="1400" b="1" dirty="0" smtClean="0"/>
               <a:t>Static bar graph</a:t>
             </a:r>
-            <a:endParaRPr lang="en-US" sz="1400" b="1" dirty="0" smtClean="0"/>
           </a:p>
         </p:txBody>
       </p:sp>

</xml_diff>